<commit_message>
update PPT release candidate for PDF generation
</commit_message>
<xml_diff>
--- a/ppt/04_Fazit.pptx
+++ b/ppt/04_Fazit.pptx
@@ -5,24 +5,21 @@
     <p:sldMasterId id="2147483663" r:id="rId4"/>
   </p:sldMasterIdLst>
   <p:notesMasterIdLst>
-    <p:notesMasterId r:id="rId12"/>
+    <p:notesMasterId r:id="rId9"/>
   </p:notesMasterIdLst>
   <p:handoutMasterIdLst>
-    <p:handoutMasterId r:id="rId13"/>
+    <p:handoutMasterId r:id="rId10"/>
   </p:handoutMasterIdLst>
   <p:sldIdLst>
     <p:sldId id="343" r:id="rId5"/>
-    <p:sldId id="344" r:id="rId6"/>
+    <p:sldId id="350" r:id="rId6"/>
     <p:sldId id="347" r:id="rId7"/>
     <p:sldId id="348" r:id="rId8"/>
-    <p:sldId id="349" r:id="rId9"/>
-    <p:sldId id="345" r:id="rId10"/>
-    <p:sldId id="346" r:id="rId11"/>
   </p:sldIdLst>
   <p:sldSz cx="12192000" cy="6858000"/>
   <p:notesSz cx="6834188" cy="9979025"/>
   <p:custDataLst>
-    <p:tags r:id="rId14"/>
+    <p:tags r:id="rId11"/>
   </p:custDataLst>
   <p:defaultTextStyle>
     <a:defPPr>
@@ -244,7 +241,7 @@
                 <a:cs typeface="Open Sans Light" pitchFamily="2" charset="0"/>
               </a:rPr>
               <a:pPr/>
-              <a:t>21.09.22</a:t>
+              <a:t>22.09.22</a:t>
             </a:fld>
             <a:endParaRPr lang="de-DE">
               <a:latin typeface="Open Sans Light" pitchFamily="2" charset="0"/>
@@ -752,6 +749,220 @@
 </p:notes>
 </file>
 
+<file path=ppt/notesSlides/notesSlide2.xml><?xml version="1.0" encoding="utf-8"?>
+<p:notes xmlns:a="http://schemas.openxmlformats.org/drawingml/2006/main" xmlns:r="http://schemas.openxmlformats.org/officeDocument/2006/relationships" xmlns:p="http://schemas.openxmlformats.org/presentationml/2006/main">
+  <p:cSld>
+    <p:spTree>
+      <p:nvGrpSpPr>
+        <p:cNvPr id="1" name=""/>
+        <p:cNvGrpSpPr/>
+        <p:nvPr/>
+      </p:nvGrpSpPr>
+      <p:grpSpPr>
+        <a:xfrm>
+          <a:off x="0" y="0"/>
+          <a:ext cx="0" cy="0"/>
+          <a:chOff x="0" y="0"/>
+          <a:chExt cx="0" cy="0"/>
+        </a:xfrm>
+      </p:grpSpPr>
+      <p:sp>
+        <p:nvSpPr>
+          <p:cNvPr id="2" name="Slide Image Placeholder 1"/>
+          <p:cNvSpPr>
+            <a:spLocks noGrp="1" noRot="1" noChangeAspect="1"/>
+          </p:cNvSpPr>
+          <p:nvPr>
+            <p:ph type="sldImg"/>
+          </p:nvPr>
+        </p:nvSpPr>
+        <p:spPr>
+          <a:xfrm>
+            <a:off x="25400" y="657225"/>
+            <a:ext cx="6765925" cy="3806825"/>
+          </a:xfrm>
+        </p:spPr>
+      </p:sp>
+      <p:sp>
+        <p:nvSpPr>
+          <p:cNvPr id="3" name="Notes Placeholder 2"/>
+          <p:cNvSpPr>
+            <a:spLocks noGrp="1"/>
+          </p:cNvSpPr>
+          <p:nvPr>
+            <p:ph type="body" idx="1"/>
+          </p:nvPr>
+        </p:nvSpPr>
+        <p:spPr/>
+        <p:txBody>
+          <a:bodyPr/>
+          <a:lstStyle/>
+          <a:p>
+            <a:r>
+              <a:rPr lang="en-CH" dirty="0"/>
+              <a:t>&lt;IDX&gt;Fazit OCI&lt;/IDX&gt;</a:t>
+            </a:r>
+          </a:p>
+        </p:txBody>
+      </p:sp>
+      <p:sp>
+        <p:nvSpPr>
+          <p:cNvPr id="4" name="Slide Number Placeholder 3"/>
+          <p:cNvSpPr>
+            <a:spLocks noGrp="1"/>
+          </p:cNvSpPr>
+          <p:nvPr>
+            <p:ph type="sldNum" sz="quarter" idx="5"/>
+          </p:nvPr>
+        </p:nvSpPr>
+        <p:spPr/>
+        <p:txBody>
+          <a:bodyPr/>
+          <a:lstStyle/>
+          <a:p>
+            <a:fld id="{F7608432-0240-4102-B75D-1C8A47998186}" type="slidenum">
+              <a:rPr lang="de-DE" smtClean="0"/>
+              <a:pPr/>
+              <a:t>2</a:t>
+            </a:fld>
+            <a:endParaRPr lang="de-DE"/>
+          </a:p>
+        </p:txBody>
+      </p:sp>
+    </p:spTree>
+    <p:extLst>
+      <p:ext uri="{BB962C8B-B14F-4D97-AF65-F5344CB8AC3E}">
+        <p14:creationId xmlns:p14="http://schemas.microsoft.com/office/powerpoint/2010/main" val="221767605"/>
+      </p:ext>
+    </p:extLst>
+  </p:cSld>
+  <p:clrMapOvr>
+    <a:masterClrMapping/>
+  </p:clrMapOvr>
+</p:notes>
+</file>
+
+<file path=ppt/notesSlides/notesSlide3.xml><?xml version="1.0" encoding="utf-8"?>
+<p:notes xmlns:a="http://schemas.openxmlformats.org/drawingml/2006/main" xmlns:r="http://schemas.openxmlformats.org/officeDocument/2006/relationships" xmlns:p="http://schemas.openxmlformats.org/presentationml/2006/main">
+  <p:cSld>
+    <p:spTree>
+      <p:nvGrpSpPr>
+        <p:cNvPr id="1" name=""/>
+        <p:cNvGrpSpPr/>
+        <p:nvPr/>
+      </p:nvGrpSpPr>
+      <p:grpSpPr>
+        <a:xfrm>
+          <a:off x="0" y="0"/>
+          <a:ext cx="0" cy="0"/>
+          <a:chOff x="0" y="0"/>
+          <a:chExt cx="0" cy="0"/>
+        </a:xfrm>
+      </p:grpSpPr>
+      <p:sp>
+        <p:nvSpPr>
+          <p:cNvPr id="2" name="Slide Image Placeholder 1"/>
+          <p:cNvSpPr>
+            <a:spLocks noGrp="1" noRot="1" noChangeAspect="1"/>
+          </p:cNvSpPr>
+          <p:nvPr>
+            <p:ph type="sldImg"/>
+          </p:nvPr>
+        </p:nvSpPr>
+        <p:spPr>
+          <a:xfrm>
+            <a:off x="25400" y="657225"/>
+            <a:ext cx="6765925" cy="3806825"/>
+          </a:xfrm>
+        </p:spPr>
+      </p:sp>
+      <p:sp>
+        <p:nvSpPr>
+          <p:cNvPr id="3" name="Notes Placeholder 2"/>
+          <p:cNvSpPr>
+            <a:spLocks noGrp="1"/>
+          </p:cNvSpPr>
+          <p:nvPr>
+            <p:ph type="body" idx="1"/>
+          </p:nvPr>
+        </p:nvSpPr>
+        <p:spPr/>
+        <p:txBody>
+          <a:bodyPr/>
+          <a:lstStyle/>
+          <a:p>
+            <a:pPr marL="0" marR="0" lvl="0" indent="0" algn="l" defTabSz="1219170" rtl="0" eaLnBrk="1" fontAlgn="auto" latinLnBrk="0" hangingPunct="1">
+              <a:lnSpc>
+                <a:spcPct val="100000"/>
+              </a:lnSpc>
+              <a:spcBef>
+                <a:spcPts val="600"/>
+              </a:spcBef>
+              <a:spcAft>
+                <a:spcPts val="600"/>
+              </a:spcAft>
+              <a:buClrTx/>
+              <a:buSzTx/>
+              <a:buFontTx/>
+              <a:buNone/>
+              <a:tabLst/>
+              <a:defRPr/>
+            </a:pPr>
+            <a:r>
+              <a:rPr lang="en-CH" dirty="0"/>
+              <a:t>&lt;IDX&gt;</a:t>
+            </a:r>
+            <a:r>
+              <a:rPr lang="en-CH"/>
+              <a:t>Fazit Terraform&lt;/</a:t>
+            </a:r>
+            <a:r>
+              <a:rPr lang="en-CH" dirty="0"/>
+              <a:t>IDX&gt;</a:t>
+            </a:r>
+          </a:p>
+          <a:p>
+            <a:endParaRPr lang="en-CH" dirty="0"/>
+          </a:p>
+        </p:txBody>
+      </p:sp>
+      <p:sp>
+        <p:nvSpPr>
+          <p:cNvPr id="4" name="Slide Number Placeholder 3"/>
+          <p:cNvSpPr>
+            <a:spLocks noGrp="1"/>
+          </p:cNvSpPr>
+          <p:nvPr>
+            <p:ph type="sldNum" sz="quarter" idx="5"/>
+          </p:nvPr>
+        </p:nvSpPr>
+        <p:spPr/>
+        <p:txBody>
+          <a:bodyPr/>
+          <a:lstStyle/>
+          <a:p>
+            <a:fld id="{F7608432-0240-4102-B75D-1C8A47998186}" type="slidenum">
+              <a:rPr lang="de-DE" smtClean="0"/>
+              <a:pPr/>
+              <a:t>3</a:t>
+            </a:fld>
+            <a:endParaRPr lang="de-DE"/>
+          </a:p>
+        </p:txBody>
+      </p:sp>
+    </p:spTree>
+    <p:extLst>
+      <p:ext uri="{BB962C8B-B14F-4D97-AF65-F5344CB8AC3E}">
+        <p14:creationId xmlns:p14="http://schemas.microsoft.com/office/powerpoint/2010/main" val="3598361178"/>
+      </p:ext>
+    </p:extLst>
+  </p:cSld>
+  <p:clrMapOvr>
+    <a:masterClrMapping/>
+  </p:clrMapOvr>
+</p:notes>
+</file>
+
 <file path=ppt/slideLayouts/slideLayout1.xml><?xml version="1.0" encoding="utf-8"?>
 <p:sldLayout xmlns:a="http://schemas.openxmlformats.org/drawingml/2006/main" xmlns:r="http://schemas.openxmlformats.org/officeDocument/2006/relationships" xmlns:p="http://schemas.openxmlformats.org/presentationml/2006/main" preserve="1" userDrawn="1">
   <p:cSld name="Titel">
@@ -1039,7 +1250,7 @@
             <a:fld id="{241EB5C9-1307-BA42-ABA2-0BC069CD8E7F}" type="datetimeFigureOut">
               <a:rPr lang="de-CH" noProof="0" smtClean="0"/>
               <a:pPr/>
-              <a:t>21.09.22</a:t>
+              <a:t>22.09.22</a:t>
             </a:fld>
             <a:endParaRPr lang="de-CH" noProof="0"/>
           </a:p>
@@ -7363,10 +7574,10 @@
       </p:grpSpPr>
       <p:sp>
         <p:nvSpPr>
-          <p:cNvPr id="4" name="Title 3">
+          <p:cNvPr id="2" name="Title 1">
             <a:extLst>
               <a:ext uri="{FF2B5EF4-FFF2-40B4-BE49-F238E27FC236}">
-                <a16:creationId xmlns:a16="http://schemas.microsoft.com/office/drawing/2014/main" id="{F07ECF3C-A04A-4C47-B240-528CD7D39C31}"/>
+                <a16:creationId xmlns:a16="http://schemas.microsoft.com/office/drawing/2014/main" id="{535D1C0E-1B96-F2EC-5966-7C0CCCC3E518}"/>
               </a:ext>
             </a:extLst>
           </p:cNvPr>
@@ -7391,10 +7602,10 @@
       </p:sp>
       <p:sp>
         <p:nvSpPr>
-          <p:cNvPr id="2" name="Content Placeholder 1">
+          <p:cNvPr id="3" name="Content Placeholder 2">
             <a:extLst>
               <a:ext uri="{FF2B5EF4-FFF2-40B4-BE49-F238E27FC236}">
-                <a16:creationId xmlns:a16="http://schemas.microsoft.com/office/drawing/2014/main" id="{6C9966E3-D767-C7D0-394E-EC5CF504CD05}"/>
+                <a16:creationId xmlns:a16="http://schemas.microsoft.com/office/drawing/2014/main" id="{B38FAB4D-2EEE-75F5-28F3-1588CBFC888E}"/>
               </a:ext>
             </a:extLst>
           </p:cNvPr>
@@ -7405,19 +7616,203 @@
             <p:ph sz="quarter" idx="10"/>
           </p:nvPr>
         </p:nvSpPr>
-        <p:spPr/>
+        <p:spPr>
+          <a:xfrm>
+            <a:off x="396875" y="1720850"/>
+            <a:ext cx="7113534" cy="4803775"/>
+          </a:xfrm>
+        </p:spPr>
         <p:txBody>
           <a:bodyPr/>
           <a:lstStyle/>
           <a:p>
-            <a:endParaRPr lang="en-CH"/>
+            <a:pPr marL="342900" indent="-342900">
+              <a:buFont typeface="Wingdings" pitchFamily="2" charset="2"/>
+              <a:buChar char="§"/>
+            </a:pPr>
+            <a:r>
+              <a:rPr lang="de-CH" dirty="0"/>
+              <a:t>Wir hoffen Sie hatten Spass mit Freunden in der Cloud</a:t>
+            </a:r>
+          </a:p>
+          <a:p>
+            <a:pPr marL="639226" lvl="1" indent="-342900">
+              <a:buFont typeface="Courier New" panose="02070309020205020404" pitchFamily="49" charset="0"/>
+              <a:buChar char="o"/>
+            </a:pPr>
+            <a:r>
+              <a:rPr lang="de-CH" dirty="0"/>
+              <a:t>Auch so überschwänglich zurück im Betrieb? </a:t>
+            </a:r>
+            <a:r>
+              <a:rPr lang="de-CH" dirty="0">
+                <a:sym typeface="Wingdings" pitchFamily="2" charset="2"/>
+              </a:rPr>
+              <a:t></a:t>
+            </a:r>
+            <a:endParaRPr lang="de-CH" dirty="0"/>
+          </a:p>
+          <a:p>
+            <a:pPr marL="342900" indent="-342900">
+              <a:buFont typeface="Wingdings" pitchFamily="2" charset="2"/>
+              <a:buChar char="§"/>
+            </a:pPr>
+            <a:r>
+              <a:rPr lang="de-CH" dirty="0"/>
+              <a:t>Oracle bietet eine Vielzahl von Ressource Typen an</a:t>
+            </a:r>
+          </a:p>
+          <a:p>
+            <a:pPr marL="639226" lvl="1" indent="-342900">
+              <a:buFont typeface="Courier New" panose="02070309020205020404" pitchFamily="49" charset="0"/>
+              <a:buChar char="o"/>
+            </a:pPr>
+            <a:r>
+              <a:rPr lang="de-CH" dirty="0"/>
+              <a:t>Die heute gezeigten decken nur ein Teil ab</a:t>
+            </a:r>
+          </a:p>
+          <a:p>
+            <a:pPr marL="639226" lvl="1" indent="-342900">
+              <a:buFont typeface="Courier New" panose="02070309020205020404" pitchFamily="49" charset="0"/>
+              <a:buChar char="o"/>
+            </a:pPr>
+            <a:r>
+              <a:rPr lang="de-CH" dirty="0"/>
+              <a:t>Je nach Budget kann man sich auch eine </a:t>
+            </a:r>
+            <a:r>
+              <a:rPr lang="de-CH" dirty="0" err="1"/>
+              <a:t>Exadata</a:t>
+            </a:r>
+            <a:r>
+              <a:rPr lang="de-CH" dirty="0"/>
+              <a:t> zusammen stellen</a:t>
+            </a:r>
+          </a:p>
+          <a:p>
+            <a:pPr marL="342900" indent="-342900">
+              <a:buFont typeface="Wingdings" pitchFamily="2" charset="2"/>
+              <a:buChar char="§"/>
+            </a:pPr>
+            <a:r>
+              <a:rPr lang="de-CH" dirty="0"/>
+              <a:t>Das Erstellen via OCI Konsole ist relative einfach</a:t>
+            </a:r>
+          </a:p>
+          <a:p>
+            <a:pPr marL="639226" lvl="1" indent="-342900">
+              <a:buFont typeface="Courier New" panose="02070309020205020404" pitchFamily="49" charset="0"/>
+              <a:buChar char="o"/>
+            </a:pPr>
+            <a:r>
+              <a:rPr lang="de-CH" dirty="0"/>
+              <a:t>Wird mit den Tools und Wizards noch einfacher</a:t>
+            </a:r>
+          </a:p>
+          <a:p>
+            <a:pPr marL="342900" indent="-342900">
+              <a:buFont typeface="Wingdings" pitchFamily="2" charset="2"/>
+              <a:buChar char="§"/>
+            </a:pPr>
+            <a:r>
+              <a:rPr lang="de-CH" dirty="0"/>
+              <a:t>Trotzdem lassen sich die via die «zusammen geklickten» Umgebungen nicht einfach wieder verwenden</a:t>
+            </a:r>
+          </a:p>
+          <a:p>
+            <a:pPr marL="342900" indent="-342900">
+              <a:buFont typeface="Courier New" panose="02070309020205020404" pitchFamily="49" charset="0"/>
+              <a:buChar char="o"/>
+            </a:pPr>
+            <a:r>
+              <a:rPr lang="de-CH" dirty="0"/>
+              <a:t>Hier hilft </a:t>
+            </a:r>
+            <a:r>
+              <a:rPr lang="de-CH" i="1" dirty="0" err="1"/>
+              <a:t>Infrastructur</a:t>
+            </a:r>
+            <a:r>
+              <a:rPr lang="de-CH" i="1" dirty="0"/>
+              <a:t> </a:t>
+            </a:r>
+            <a:r>
+              <a:rPr lang="de-CH" i="1" dirty="0" err="1"/>
+              <a:t>as</a:t>
+            </a:r>
+            <a:r>
+              <a:rPr lang="de-CH" i="1" dirty="0"/>
+              <a:t> Code (</a:t>
+            </a:r>
+            <a:r>
+              <a:rPr lang="de-CH" i="1" dirty="0" err="1"/>
+              <a:t>IaC</a:t>
+            </a:r>
+            <a:r>
+              <a:rPr lang="de-CH" i="1" dirty="0"/>
+              <a:t>) </a:t>
+            </a:r>
+            <a:r>
+              <a:rPr lang="de-CH" dirty="0"/>
+              <a:t>respektive Terraform</a:t>
+            </a:r>
           </a:p>
         </p:txBody>
       </p:sp>
+      <p:pic>
+        <p:nvPicPr>
+          <p:cNvPr id="5" name="Picture 2">
+            <a:extLst>
+              <a:ext uri="{FF2B5EF4-FFF2-40B4-BE49-F238E27FC236}">
+                <a16:creationId xmlns:a16="http://schemas.microsoft.com/office/drawing/2014/main" id="{64583A74-BB11-B35B-3905-822B9D6D6339}"/>
+              </a:ext>
+            </a:extLst>
+          </p:cNvPr>
+          <p:cNvPicPr>
+            <a:picLocks noGrp="1" noChangeAspect="1" noChangeArrowheads="1"/>
+          </p:cNvPicPr>
+          <p:nvPr>
+            <p:ph sz="quarter" idx="11"/>
+          </p:nvPr>
+        </p:nvPicPr>
+        <p:blipFill>
+          <a:blip r:embed="rId3">
+            <a:extLst>
+              <a:ext uri="{28A0092B-C50C-407E-A947-70E740481C1C}">
+                <a14:useLocalDpi xmlns:a14="http://schemas.microsoft.com/office/drawing/2010/main" val="0"/>
+              </a:ext>
+            </a:extLst>
+          </a:blip>
+          <a:srcRect/>
+          <a:stretch>
+            <a:fillRect/>
+          </a:stretch>
+        </p:blipFill>
+        <p:spPr bwMode="auto">
+          <a:xfrm>
+            <a:off x="7197725" y="1332672"/>
+            <a:ext cx="4994275" cy="4809871"/>
+          </a:xfrm>
+          <a:prstGeom prst="rect">
+            <a:avLst/>
+          </a:prstGeom>
+          <a:noFill/>
+          <a:extLst>
+            <a:ext uri="{909E8E84-426E-40DD-AFC4-6F175D3DCCD1}">
+              <a14:hiddenFill xmlns:a14="http://schemas.microsoft.com/office/drawing/2010/main">
+                <a:solidFill>
+                  <a:srgbClr val="FFFFFF"/>
+                </a:solidFill>
+              </a14:hiddenFill>
+            </a:ext>
+          </a:extLst>
+        </p:spPr>
+      </p:pic>
     </p:spTree>
     <p:extLst>
       <p:ext uri="{BB962C8B-B14F-4D97-AF65-F5344CB8AC3E}">
-        <p14:creationId xmlns:p14="http://schemas.microsoft.com/office/powerpoint/2010/main" val="740470740"/>
+        <p14:creationId xmlns:p14="http://schemas.microsoft.com/office/powerpoint/2010/main" val="3081597925"/>
       </p:ext>
     </p:extLst>
   </p:cSld>
@@ -7813,393 +8208,6 @@
     <p:extLst>
       <p:ext uri="{BB962C8B-B14F-4D97-AF65-F5344CB8AC3E}">
         <p14:creationId xmlns:p14="http://schemas.microsoft.com/office/powerpoint/2010/main" val="1873403762"/>
-      </p:ext>
-    </p:extLst>
-  </p:cSld>
-  <p:clrMapOvr>
-    <a:masterClrMapping/>
-  </p:clrMapOvr>
-</p:sld>
-</file>
-
-<file path=ppt/slides/slide5.xml><?xml version="1.0" encoding="utf-8"?>
-<p:sld xmlns:a="http://schemas.openxmlformats.org/drawingml/2006/main" xmlns:r="http://schemas.openxmlformats.org/officeDocument/2006/relationships" xmlns:p="http://schemas.openxmlformats.org/presentationml/2006/main">
-  <p:cSld>
-    <p:spTree>
-      <p:nvGrpSpPr>
-        <p:cNvPr id="1" name=""/>
-        <p:cNvGrpSpPr/>
-        <p:nvPr/>
-      </p:nvGrpSpPr>
-      <p:grpSpPr>
-        <a:xfrm>
-          <a:off x="0" y="0"/>
-          <a:ext cx="0" cy="0"/>
-          <a:chOff x="0" y="0"/>
-          <a:chExt cx="0" cy="0"/>
-        </a:xfrm>
-      </p:grpSpPr>
-      <p:sp>
-        <p:nvSpPr>
-          <p:cNvPr id="2" name="Title 1">
-            <a:extLst>
-              <a:ext uri="{FF2B5EF4-FFF2-40B4-BE49-F238E27FC236}">
-                <a16:creationId xmlns:a16="http://schemas.microsoft.com/office/drawing/2014/main" id="{236DDA02-3B70-1B24-FAA1-370674B3910C}"/>
-              </a:ext>
-            </a:extLst>
-          </p:cNvPr>
-          <p:cNvSpPr>
-            <a:spLocks noGrp="1"/>
-          </p:cNvSpPr>
-          <p:nvPr>
-            <p:ph type="title"/>
-          </p:nvPr>
-        </p:nvSpPr>
-        <p:spPr/>
-        <p:txBody>
-          <a:bodyPr/>
-          <a:lstStyle/>
-          <a:p>
-            <a:endParaRPr lang="en-CH"/>
-          </a:p>
-        </p:txBody>
-      </p:sp>
-      <p:sp>
-        <p:nvSpPr>
-          <p:cNvPr id="3" name="Content Placeholder 2">
-            <a:extLst>
-              <a:ext uri="{FF2B5EF4-FFF2-40B4-BE49-F238E27FC236}">
-                <a16:creationId xmlns:a16="http://schemas.microsoft.com/office/drawing/2014/main" id="{6454A921-1433-9FEA-CA42-A9EC5F006DB7}"/>
-              </a:ext>
-            </a:extLst>
-          </p:cNvPr>
-          <p:cNvSpPr>
-            <a:spLocks noGrp="1"/>
-          </p:cNvSpPr>
-          <p:nvPr>
-            <p:ph sz="quarter" idx="10"/>
-          </p:nvPr>
-        </p:nvSpPr>
-        <p:spPr/>
-        <p:txBody>
-          <a:bodyPr/>
-          <a:lstStyle/>
-          <a:p>
-            <a:endParaRPr lang="en-CH"/>
-          </a:p>
-        </p:txBody>
-      </p:sp>
-      <p:pic>
-        <p:nvPicPr>
-          <p:cNvPr id="1026" name="Picture 2">
-            <a:extLst>
-              <a:ext uri="{FF2B5EF4-FFF2-40B4-BE49-F238E27FC236}">
-                <a16:creationId xmlns:a16="http://schemas.microsoft.com/office/drawing/2014/main" id="{810D2699-8A14-1E9C-BE30-482FA746A80B}"/>
-              </a:ext>
-            </a:extLst>
-          </p:cNvPr>
-          <p:cNvPicPr>
-            <a:picLocks noGrp="1" noChangeAspect="1" noChangeArrowheads="1"/>
-          </p:cNvPicPr>
-          <p:nvPr>
-            <p:ph sz="quarter" idx="11"/>
-          </p:nvPr>
-        </p:nvPicPr>
-        <p:blipFill>
-          <a:blip r:embed="rId2">
-            <a:extLst>
-              <a:ext uri="{28A0092B-C50C-407E-A947-70E740481C1C}">
-                <a14:useLocalDpi xmlns:a14="http://schemas.microsoft.com/office/drawing/2010/main" val="0"/>
-              </a:ext>
-            </a:extLst>
-          </a:blip>
-          <a:srcRect/>
-          <a:stretch>
-            <a:fillRect/>
-          </a:stretch>
-        </p:blipFill>
-        <p:spPr bwMode="auto">
-          <a:xfrm>
-            <a:off x="5949904" y="188499"/>
-            <a:ext cx="6043073" cy="5987290"/>
-          </a:xfrm>
-          <a:prstGeom prst="rect">
-            <a:avLst/>
-          </a:prstGeom>
-          <a:noFill/>
-          <a:extLst>
-            <a:ext uri="{909E8E84-426E-40DD-AFC4-6F175D3DCCD1}">
-              <a14:hiddenFill xmlns:a14="http://schemas.microsoft.com/office/drawing/2010/main">
-                <a:solidFill>
-                  <a:srgbClr val="FFFFFF"/>
-                </a:solidFill>
-              </a14:hiddenFill>
-            </a:ext>
-          </a:extLst>
-        </p:spPr>
-      </p:pic>
-    </p:spTree>
-    <p:extLst>
-      <p:ext uri="{BB962C8B-B14F-4D97-AF65-F5344CB8AC3E}">
-        <p14:creationId xmlns:p14="http://schemas.microsoft.com/office/powerpoint/2010/main" val="3187972607"/>
-      </p:ext>
-    </p:extLst>
-  </p:cSld>
-  <p:clrMapOvr>
-    <a:masterClrMapping/>
-  </p:clrMapOvr>
-</p:sld>
-</file>
-
-<file path=ppt/slides/slide6.xml><?xml version="1.0" encoding="utf-8"?>
-<p:sld xmlns:a="http://schemas.openxmlformats.org/drawingml/2006/main" xmlns:r="http://schemas.openxmlformats.org/officeDocument/2006/relationships" xmlns:p="http://schemas.openxmlformats.org/presentationml/2006/main">
-  <p:cSld>
-    <p:spTree>
-      <p:nvGrpSpPr>
-        <p:cNvPr id="1" name=""/>
-        <p:cNvGrpSpPr/>
-        <p:nvPr/>
-      </p:nvGrpSpPr>
-      <p:grpSpPr>
-        <a:xfrm>
-          <a:off x="0" y="0"/>
-          <a:ext cx="0" cy="0"/>
-          <a:chOff x="0" y="0"/>
-          <a:chExt cx="0" cy="0"/>
-        </a:xfrm>
-      </p:grpSpPr>
-      <p:sp>
-        <p:nvSpPr>
-          <p:cNvPr id="2" name="Title 1">
-            <a:extLst>
-              <a:ext uri="{FF2B5EF4-FFF2-40B4-BE49-F238E27FC236}">
-                <a16:creationId xmlns:a16="http://schemas.microsoft.com/office/drawing/2014/main" id="{2A032FF0-2365-18D4-C09C-B8549648AD02}"/>
-              </a:ext>
-            </a:extLst>
-          </p:cNvPr>
-          <p:cNvSpPr>
-            <a:spLocks noGrp="1"/>
-          </p:cNvSpPr>
-          <p:nvPr>
-            <p:ph type="title"/>
-          </p:nvPr>
-        </p:nvSpPr>
-        <p:spPr/>
-        <p:txBody>
-          <a:bodyPr/>
-          <a:lstStyle/>
-          <a:p>
-            <a:endParaRPr lang="en-CH"/>
-          </a:p>
-        </p:txBody>
-      </p:sp>
-      <p:sp>
-        <p:nvSpPr>
-          <p:cNvPr id="3" name="Content Placeholder 2">
-            <a:extLst>
-              <a:ext uri="{FF2B5EF4-FFF2-40B4-BE49-F238E27FC236}">
-                <a16:creationId xmlns:a16="http://schemas.microsoft.com/office/drawing/2014/main" id="{11ED66A9-D6F5-F71C-269D-B2914D228A23}"/>
-              </a:ext>
-            </a:extLst>
-          </p:cNvPr>
-          <p:cNvSpPr>
-            <a:spLocks noGrp="1"/>
-          </p:cNvSpPr>
-          <p:nvPr>
-            <p:ph sz="quarter" idx="10"/>
-          </p:nvPr>
-        </p:nvSpPr>
-        <p:spPr/>
-        <p:txBody>
-          <a:bodyPr/>
-          <a:lstStyle/>
-          <a:p>
-            <a:endParaRPr lang="en-CH" dirty="0"/>
-          </a:p>
-        </p:txBody>
-      </p:sp>
-      <p:pic>
-        <p:nvPicPr>
-          <p:cNvPr id="2052" name="Picture 4">
-            <a:extLst>
-              <a:ext uri="{FF2B5EF4-FFF2-40B4-BE49-F238E27FC236}">
-                <a16:creationId xmlns:a16="http://schemas.microsoft.com/office/drawing/2014/main" id="{341F8203-CC3F-E1FB-99D8-098C02D4512F}"/>
-              </a:ext>
-            </a:extLst>
-          </p:cNvPr>
-          <p:cNvPicPr>
-            <a:picLocks noGrp="1" noChangeAspect="1" noChangeArrowheads="1"/>
-          </p:cNvPicPr>
-          <p:nvPr>
-            <p:ph sz="quarter" idx="11"/>
-          </p:nvPr>
-        </p:nvPicPr>
-        <p:blipFill>
-          <a:blip r:embed="rId2">
-            <a:extLst>
-              <a:ext uri="{28A0092B-C50C-407E-A947-70E740481C1C}">
-                <a14:useLocalDpi xmlns:a14="http://schemas.microsoft.com/office/drawing/2010/main" val="0"/>
-              </a:ext>
-            </a:extLst>
-          </a:blip>
-          <a:srcRect/>
-          <a:stretch>
-            <a:fillRect/>
-          </a:stretch>
-        </p:blipFill>
-        <p:spPr bwMode="auto">
-          <a:xfrm>
-            <a:off x="6952710" y="221286"/>
-            <a:ext cx="4198838" cy="5749180"/>
-          </a:xfrm>
-          <a:prstGeom prst="rect">
-            <a:avLst/>
-          </a:prstGeom>
-          <a:noFill/>
-          <a:extLst>
-            <a:ext uri="{909E8E84-426E-40DD-AFC4-6F175D3DCCD1}">
-              <a14:hiddenFill xmlns:a14="http://schemas.microsoft.com/office/drawing/2010/main">
-                <a:solidFill>
-                  <a:srgbClr val="FFFFFF"/>
-                </a:solidFill>
-              </a14:hiddenFill>
-            </a:ext>
-          </a:extLst>
-        </p:spPr>
-      </p:pic>
-    </p:spTree>
-    <p:extLst>
-      <p:ext uri="{BB962C8B-B14F-4D97-AF65-F5344CB8AC3E}">
-        <p14:creationId xmlns:p14="http://schemas.microsoft.com/office/powerpoint/2010/main" val="667667959"/>
-      </p:ext>
-    </p:extLst>
-  </p:cSld>
-  <p:clrMapOvr>
-    <a:masterClrMapping/>
-  </p:clrMapOvr>
-</p:sld>
-</file>
-
-<file path=ppt/slides/slide7.xml><?xml version="1.0" encoding="utf-8"?>
-<p:sld xmlns:a="http://schemas.openxmlformats.org/drawingml/2006/main" xmlns:r="http://schemas.openxmlformats.org/officeDocument/2006/relationships" xmlns:p="http://schemas.openxmlformats.org/presentationml/2006/main">
-  <p:cSld>
-    <p:spTree>
-      <p:nvGrpSpPr>
-        <p:cNvPr id="1" name=""/>
-        <p:cNvGrpSpPr/>
-        <p:nvPr/>
-      </p:nvGrpSpPr>
-      <p:grpSpPr>
-        <a:xfrm>
-          <a:off x="0" y="0"/>
-          <a:ext cx="0" cy="0"/>
-          <a:chOff x="0" y="0"/>
-          <a:chExt cx="0" cy="0"/>
-        </a:xfrm>
-      </p:grpSpPr>
-      <p:sp>
-        <p:nvSpPr>
-          <p:cNvPr id="2" name="Title 1">
-            <a:extLst>
-              <a:ext uri="{FF2B5EF4-FFF2-40B4-BE49-F238E27FC236}">
-                <a16:creationId xmlns:a16="http://schemas.microsoft.com/office/drawing/2014/main" id="{C8540382-4970-C99C-2214-24FB4A2F2348}"/>
-              </a:ext>
-            </a:extLst>
-          </p:cNvPr>
-          <p:cNvSpPr>
-            <a:spLocks noGrp="1"/>
-          </p:cNvSpPr>
-          <p:nvPr>
-            <p:ph type="title"/>
-          </p:nvPr>
-        </p:nvSpPr>
-        <p:spPr/>
-        <p:txBody>
-          <a:bodyPr/>
-          <a:lstStyle/>
-          <a:p>
-            <a:endParaRPr lang="en-CH"/>
-          </a:p>
-        </p:txBody>
-      </p:sp>
-      <p:sp>
-        <p:nvSpPr>
-          <p:cNvPr id="3" name="Content Placeholder 2">
-            <a:extLst>
-              <a:ext uri="{FF2B5EF4-FFF2-40B4-BE49-F238E27FC236}">
-                <a16:creationId xmlns:a16="http://schemas.microsoft.com/office/drawing/2014/main" id="{A9F86A6E-FB0D-73A3-A7C7-E74CDB0FC218}"/>
-              </a:ext>
-            </a:extLst>
-          </p:cNvPr>
-          <p:cNvSpPr>
-            <a:spLocks noGrp="1"/>
-          </p:cNvSpPr>
-          <p:nvPr>
-            <p:ph sz="quarter" idx="10"/>
-          </p:nvPr>
-        </p:nvSpPr>
-        <p:spPr/>
-        <p:txBody>
-          <a:bodyPr/>
-          <a:lstStyle/>
-          <a:p>
-            <a:endParaRPr lang="en-CH"/>
-          </a:p>
-        </p:txBody>
-      </p:sp>
-      <p:pic>
-        <p:nvPicPr>
-          <p:cNvPr id="1026" name="Picture 2">
-            <a:extLst>
-              <a:ext uri="{FF2B5EF4-FFF2-40B4-BE49-F238E27FC236}">
-                <a16:creationId xmlns:a16="http://schemas.microsoft.com/office/drawing/2014/main" id="{E098D738-53E1-3332-17B0-51CECF03055C}"/>
-              </a:ext>
-            </a:extLst>
-          </p:cNvPr>
-          <p:cNvPicPr>
-            <a:picLocks noGrp="1" noChangeAspect="1" noChangeArrowheads="1"/>
-          </p:cNvPicPr>
-          <p:nvPr>
-            <p:ph sz="quarter" idx="11"/>
-          </p:nvPr>
-        </p:nvPicPr>
-        <p:blipFill>
-          <a:blip r:embed="rId2">
-            <a:extLst>
-              <a:ext uri="{28A0092B-C50C-407E-A947-70E740481C1C}">
-                <a14:useLocalDpi xmlns:a14="http://schemas.microsoft.com/office/drawing/2010/main" val="0"/>
-              </a:ext>
-            </a:extLst>
-          </a:blip>
-          <a:srcRect/>
-          <a:stretch>
-            <a:fillRect/>
-          </a:stretch>
-        </p:blipFill>
-        <p:spPr bwMode="auto">
-          <a:xfrm>
-            <a:off x="6224589" y="823706"/>
-            <a:ext cx="5493703" cy="5290858"/>
-          </a:xfrm>
-          <a:prstGeom prst="rect">
-            <a:avLst/>
-          </a:prstGeom>
-          <a:noFill/>
-          <a:extLst>
-            <a:ext uri="{909E8E84-426E-40DD-AFC4-6F175D3DCCD1}">
-              <a14:hiddenFill xmlns:a14="http://schemas.microsoft.com/office/drawing/2010/main">
-                <a:solidFill>
-                  <a:srgbClr val="FFFFFF"/>
-                </a:solidFill>
-              </a14:hiddenFill>
-            </a:ext>
-          </a:extLst>
-        </p:spPr>
-      </p:pic>
-    </p:spTree>
-    <p:extLst>
-      <p:ext uri="{BB962C8B-B14F-4D97-AF65-F5344CB8AC3E}">
-        <p14:creationId xmlns:p14="http://schemas.microsoft.com/office/powerpoint/2010/main" val="819791555"/>
       </p:ext>
     </p:extLst>
   </p:cSld>
@@ -9074,6 +9082,31 @@
 </file>
 
 <file path=customXml/item1.xml><?xml version="1.0" encoding="utf-8"?>
+<p:properties xmlns:p="http://schemas.microsoft.com/office/2006/metadata/properties" xmlns:xsi="http://www.w3.org/2001/XMLSchema-instance" xmlns:pc="http://schemas.microsoft.com/office/infopath/2007/PartnerControls">
+  <documentManagement>
+    <Responsible xmlns="49d9e7ef-5d44-4367-90d6-2cc1a328c29d">
+      <UserInfo>
+        <DisplayName/>
+        <AccountId xsi:nil="true"/>
+        <AccountType/>
+      </UserInfo>
+    </Responsible>
+    <SecurityLevel xmlns="49d9e7ef-5d44-4367-90d6-2cc1a328c29d">internal</SecurityLevel>
+    <ValidTo xmlns="49d9e7ef-5d44-4367-90d6-2cc1a328c29d" xsi:nil="true"/>
+  </documentManagement>
+</p:properties>
+</file>
+
+<file path=customXml/item2.xml><?xml version="1.0" encoding="utf-8"?>
+<?mso-contentType ?>
+<FormTemplates xmlns="http://schemas.microsoft.com/sharepoint/v3/contenttype/forms">
+  <Display>DocumentLibraryForm</Display>
+  <Edit>DocumentLibraryForm</Edit>
+  <New>DocumentLibraryForm</New>
+</FormTemplates>
+</file>
+
+<file path=customXml/item3.xml><?xml version="1.0" encoding="utf-8"?>
 <ct:contentTypeSchema xmlns:ct="http://schemas.microsoft.com/office/2006/metadata/contentType" xmlns:ma="http://schemas.microsoft.com/office/2006/metadata/properties/metaAttributes" ct:_="" ma:_="" ma:contentTypeName="GeneralDocType" ma:contentTypeID="0x0101001637CE4A8E76C4448E317F64D25C51140053B0137A43F09C44846777061E0F056A" ma:contentTypeVersion="44" ma:contentTypeDescription="" ma:contentTypeScope="" ma:versionID="2a2d05d53e7b3be4547158bc9b43f65d">
   <xsd:schema xmlns:xsd="http://www.w3.org/2001/XMLSchema" xmlns:xs="http://www.w3.org/2001/XMLSchema" xmlns:p="http://schemas.microsoft.com/office/2006/metadata/properties" xmlns:ns2="49d9e7ef-5d44-4367-90d6-2cc1a328c29d" xmlns:ns3="bd04218d-e560-4a5d-ad18-c196d2420a14" targetNamespace="http://schemas.microsoft.com/office/2006/metadata/properties" ma:root="true" ma:fieldsID="e20b88565520550da69d37cab28b1173" ns2:_="" ns3:_="">
     <xsd:import namespace="49d9e7ef-5d44-4367-90d6-2cc1a328c29d"/>
@@ -9327,32 +9360,32 @@
 </ct:contentTypeSchema>
 </file>
 
-<file path=customXml/item2.xml><?xml version="1.0" encoding="utf-8"?>
-<?mso-contentType ?>
-<FormTemplates xmlns="http://schemas.microsoft.com/sharepoint/v3/contenttype/forms">
-  <Display>DocumentLibraryForm</Display>
-  <Edit>DocumentLibraryForm</Edit>
-  <New>DocumentLibraryForm</New>
-</FormTemplates>
+<file path=customXml/itemProps1.xml><?xml version="1.0" encoding="utf-8"?>
+<ds:datastoreItem xmlns:ds="http://schemas.openxmlformats.org/officeDocument/2006/customXml" ds:itemID="{33EB2428-06DB-42A3-A94E-EC55E92563A2}">
+  <ds:schemaRefs>
+    <ds:schemaRef ds:uri="http://purl.org/dc/terms/"/>
+    <ds:schemaRef ds:uri="http://schemas.openxmlformats.org/package/2006/metadata/core-properties"/>
+    <ds:schemaRef ds:uri="http://purl.org/dc/dcmitype/"/>
+    <ds:schemaRef ds:uri="http://schemas.microsoft.com/office/2006/documentManagement/types"/>
+    <ds:schemaRef ds:uri="http://purl.org/dc/elements/1.1/"/>
+    <ds:schemaRef ds:uri="http://schemas.microsoft.com/office/2006/metadata/properties"/>
+    <ds:schemaRef ds:uri="http://schemas.microsoft.com/office/infopath/2007/PartnerControls"/>
+    <ds:schemaRef ds:uri="c4b9e184-14ce-443c-b89e-4fb866c8376b"/>
+    <ds:schemaRef ds:uri="http://www.w3.org/XML/1998/namespace"/>
+    <ds:schemaRef ds:uri="49d9e7ef-5d44-4367-90d6-2cc1a328c29d"/>
+  </ds:schemaRefs>
+</ds:datastoreItem>
 </file>
 
-<file path=customXml/item3.xml><?xml version="1.0" encoding="utf-8"?>
-<p:properties xmlns:p="http://schemas.microsoft.com/office/2006/metadata/properties" xmlns:xsi="http://www.w3.org/2001/XMLSchema-instance" xmlns:pc="http://schemas.microsoft.com/office/infopath/2007/PartnerControls">
-  <documentManagement>
-    <Responsible xmlns="49d9e7ef-5d44-4367-90d6-2cc1a328c29d">
-      <UserInfo>
-        <DisplayName/>
-        <AccountId xsi:nil="true"/>
-        <AccountType/>
-      </UserInfo>
-    </Responsible>
-    <SecurityLevel xmlns="49d9e7ef-5d44-4367-90d6-2cc1a328c29d">internal</SecurityLevel>
-    <ValidTo xmlns="49d9e7ef-5d44-4367-90d6-2cc1a328c29d" xsi:nil="true"/>
-  </documentManagement>
-</p:properties>
+<file path=customXml/itemProps2.xml><?xml version="1.0" encoding="utf-8"?>
+<ds:datastoreItem xmlns:ds="http://schemas.openxmlformats.org/officeDocument/2006/customXml" ds:itemID="{FB963054-8648-43A2-92C9-BA1FDBC93AF4}">
+  <ds:schemaRefs>
+    <ds:schemaRef ds:uri="http://schemas.microsoft.com/sharepoint/v3/contenttype/forms"/>
+  </ds:schemaRefs>
+</ds:datastoreItem>
 </file>
 
-<file path=customXml/itemProps1.xml><?xml version="1.0" encoding="utf-8"?>
+<file path=customXml/itemProps3.xml><?xml version="1.0" encoding="utf-8"?>
 <ds:datastoreItem xmlns:ds="http://schemas.openxmlformats.org/officeDocument/2006/customXml" ds:itemID="{3E992F7D-77EB-45D8-83EA-D9433BE24725}">
   <ds:schemaRefs>
     <ds:schemaRef ds:uri="http://schemas.microsoft.com/office/2006/metadata/contentType"/>
@@ -9369,29 +9402,4 @@
     <ds:schemaRef ds:uri="http://schemas.microsoft.com/internal/obd"/>
   </ds:schemaRefs>
 </ds:datastoreItem>
-</file>
-
-<file path=customXml/itemProps2.xml><?xml version="1.0" encoding="utf-8"?>
-<ds:datastoreItem xmlns:ds="http://schemas.openxmlformats.org/officeDocument/2006/customXml" ds:itemID="{FB963054-8648-43A2-92C9-BA1FDBC93AF4}">
-  <ds:schemaRefs>
-    <ds:schemaRef ds:uri="http://schemas.microsoft.com/sharepoint/v3/contenttype/forms"/>
-  </ds:schemaRefs>
-</ds:datastoreItem>
-</file>
-
-<file path=customXml/itemProps3.xml><?xml version="1.0" encoding="utf-8"?>
-<ds:datastoreItem xmlns:ds="http://schemas.openxmlformats.org/officeDocument/2006/customXml" ds:itemID="{33EB2428-06DB-42A3-A94E-EC55E92563A2}">
-  <ds:schemaRefs>
-    <ds:schemaRef ds:uri="http://purl.org/dc/terms/"/>
-    <ds:schemaRef ds:uri="http://schemas.openxmlformats.org/package/2006/metadata/core-properties"/>
-    <ds:schemaRef ds:uri="http://purl.org/dc/dcmitype/"/>
-    <ds:schemaRef ds:uri="http://schemas.microsoft.com/office/2006/documentManagement/types"/>
-    <ds:schemaRef ds:uri="http://purl.org/dc/elements/1.1/"/>
-    <ds:schemaRef ds:uri="http://schemas.microsoft.com/office/2006/metadata/properties"/>
-    <ds:schemaRef ds:uri="http://schemas.microsoft.com/office/infopath/2007/PartnerControls"/>
-    <ds:schemaRef ds:uri="c4b9e184-14ce-443c-b89e-4fb866c8376b"/>
-    <ds:schemaRef ds:uri="http://www.w3.org/XML/1998/namespace"/>
-    <ds:schemaRef ds:uri="49d9e7ef-5d44-4367-90d6-2cc1a328c29d"/>
-  </ds:schemaRefs>
-</ds:datastoreItem>
 </file>
</xml_diff>